<commit_message>
Made changes to the slide master and adjusted postiioning of icons and tables
</commit_message>
<xml_diff>
--- a/script/RedZoneInput.pptx
+++ b/script/RedZoneInput.pptx
@@ -801,7 +801,7 @@
                 <a:tabLst/>
                 <a:defRPr/>
               </a:pPr>
-              <a:t>12/1/2021</a:t>
+              <a:t>11/11/2022</a:t>
             </a:fld>
             <a:endParaRPr kumimoji="0" lang="en-US" sz="1765" b="0" i="0" u="none" strike="noStrike" kern="1200" cap="none" spc="0" normalizeH="0" baseline="0" noProof="0">
               <a:ln>
@@ -1658,60 +1658,6 @@
           <a:chExt cx="0" cy="0"/>
         </a:xfrm>
       </p:grpSpPr>
-      <p:sp>
-        <p:nvSpPr>
-          <p:cNvPr id="4" name="Title 1">
-            <a:extLst>
-              <a:ext uri="{FF2B5EF4-FFF2-40B4-BE49-F238E27FC236}">
-                <a16:creationId xmlns:a16="http://schemas.microsoft.com/office/drawing/2014/main" id="{8AE8868F-6D8F-45AE-B298-D99C0E002CE5}"/>
-              </a:ext>
-            </a:extLst>
-          </p:cNvPr>
-          <p:cNvSpPr>
-            <a:spLocks noGrp="1"/>
-          </p:cNvSpPr>
-          <p:nvPr>
-            <p:ph type="title"/>
-          </p:nvPr>
-        </p:nvSpPr>
-        <p:spPr>
-          <a:xfrm>
-            <a:off x="-1" y="2366"/>
-            <a:ext cx="7503275" cy="582250"/>
-          </a:xfrm>
-          <a:solidFill>
-            <a:schemeClr val="bg1">
-              <a:lumMod val="95000"/>
-            </a:schemeClr>
-          </a:solidFill>
-        </p:spPr>
-        <p:txBody>
-          <a:bodyPr vert="horz" wrap="square" lIns="146284" tIns="91427" rIns="146284" bIns="91427" rtlCol="0" anchor="t">
-            <a:noAutofit/>
-          </a:bodyPr>
-          <a:lstStyle/>
-          <a:p>
-            <a:pPr defTabSz="914367">
-              <a:lnSpc>
-                <a:spcPct val="90000"/>
-              </a:lnSpc>
-            </a:pPr>
-            <a:endParaRPr lang="en-US" sz="2400" b="0" spc="-100" dirty="0">
-              <a:gradFill>
-                <a:gsLst>
-                  <a:gs pos="2917">
-                    <a:schemeClr val="tx1"/>
-                  </a:gs>
-                  <a:gs pos="30000">
-                    <a:schemeClr val="tx1"/>
-                  </a:gs>
-                </a:gsLst>
-                <a:lin ang="5400000" scaled="0"/>
-              </a:gradFill>
-            </a:endParaRPr>
-          </a:p>
-        </p:txBody>
-      </p:sp>
       <p:graphicFrame>
         <p:nvGraphicFramePr>
           <p:cNvPr id="27" name="Table 26">
@@ -1727,13 +1673,13 @@
           <p:nvPr userDrawn="1">
             <p:extLst>
               <p:ext uri="{D42A27DB-BD31-4B8C-83A1-F6EECF244321}">
-                <p14:modId xmlns:p14="http://schemas.microsoft.com/office/powerpoint/2010/main" val="3821856400"/>
+                <p14:modId xmlns:p14="http://schemas.microsoft.com/office/powerpoint/2010/main" val="3990518215"/>
               </p:ext>
             </p:extLst>
           </p:nvPr>
         </p:nvGraphicFramePr>
         <p:xfrm>
-          <a:off x="6353297" y="294815"/>
+          <a:off x="6363216" y="636771"/>
           <a:ext cx="1150721" cy="296458"/>
         </p:xfrm>
         <a:graphic>
@@ -1934,7 +1880,7 @@
         </p:nvGrpSpPr>
         <p:grpSpPr>
           <a:xfrm>
-            <a:off x="7504770" y="-4291"/>
+            <a:off x="7507486" y="350432"/>
             <a:ext cx="4667415" cy="588907"/>
             <a:chOff x="7159083" y="-867193"/>
             <a:chExt cx="4667415" cy="461667"/>
@@ -2453,8 +2399,8 @@
         </p:nvSpPr>
         <p:spPr>
           <a:xfrm>
-            <a:off x="19050" y="584200"/>
-            <a:ext cx="12172950" cy="6271434"/>
+            <a:off x="19050" y="1006979"/>
+            <a:ext cx="12172950" cy="5848655"/>
           </a:xfrm>
         </p:spPr>
         <p:txBody>
@@ -2480,13 +2426,13 @@
           <p:nvPr userDrawn="1">
             <p:extLst>
               <p:ext uri="{D42A27DB-BD31-4B8C-83A1-F6EECF244321}">
-                <p14:modId xmlns:p14="http://schemas.microsoft.com/office/powerpoint/2010/main" val="181238616"/>
+                <p14:modId xmlns:p14="http://schemas.microsoft.com/office/powerpoint/2010/main" val="169841313"/>
               </p:ext>
             </p:extLst>
           </p:nvPr>
         </p:nvGraphicFramePr>
         <p:xfrm>
-          <a:off x="5215536" y="-1740"/>
+          <a:off x="5225455" y="340216"/>
           <a:ext cx="1130558" cy="296459"/>
         </p:xfrm>
         <a:graphic>
@@ -2688,13 +2634,13 @@
           <p:nvPr userDrawn="1">
             <p:extLst>
               <p:ext uri="{D42A27DB-BD31-4B8C-83A1-F6EECF244321}">
-                <p14:modId xmlns:p14="http://schemas.microsoft.com/office/powerpoint/2010/main" val="140132744"/>
+                <p14:modId xmlns:p14="http://schemas.microsoft.com/office/powerpoint/2010/main" val="3648508608"/>
               </p:ext>
             </p:extLst>
           </p:nvPr>
         </p:nvGraphicFramePr>
         <p:xfrm>
-          <a:off x="6359234" y="2366"/>
+          <a:off x="6369153" y="344322"/>
           <a:ext cx="1138333" cy="296458"/>
         </p:xfrm>
         <a:graphic>
@@ -2912,7 +2858,7 @@
         </p:blipFill>
         <p:spPr>
           <a:xfrm>
-            <a:off x="6339413" y="294435"/>
+            <a:off x="6349332" y="636391"/>
             <a:ext cx="279521" cy="296838"/>
           </a:xfrm>
           <a:prstGeom prst="rect">
@@ -2951,7 +2897,7 @@
         </p:blipFill>
         <p:spPr>
           <a:xfrm>
-            <a:off x="6374995" y="47948"/>
+            <a:off x="6384914" y="389904"/>
             <a:ext cx="208359" cy="208359"/>
           </a:xfrm>
           <a:prstGeom prst="rect">
@@ -2990,7 +2936,7 @@
         </p:blipFill>
         <p:spPr>
           <a:xfrm>
-            <a:off x="5208333" y="0"/>
+            <a:off x="5218252" y="341956"/>
             <a:ext cx="304917" cy="304917"/>
           </a:xfrm>
           <a:prstGeom prst="rect">
@@ -2998,6 +2944,168 @@
           </a:prstGeom>
         </p:spPr>
       </p:pic>
+      <p:sp>
+        <p:nvSpPr>
+          <p:cNvPr id="5" name="Rectangle 4">
+            <a:extLst>
+              <a:ext uri="{FF2B5EF4-FFF2-40B4-BE49-F238E27FC236}">
+                <a16:creationId xmlns:a16="http://schemas.microsoft.com/office/drawing/2014/main" id="{B158F4A1-B86C-0327-7C90-119A9CCCBFB8}"/>
+              </a:ext>
+            </a:extLst>
+          </p:cNvPr>
+          <p:cNvSpPr/>
+          <p:nvPr userDrawn="1"/>
+        </p:nvSpPr>
+        <p:spPr>
+          <a:xfrm>
+            <a:off x="865" y="487"/>
+            <a:ext cx="12190271" cy="339729"/>
+          </a:xfrm>
+          <a:prstGeom prst="rect">
+            <a:avLst/>
+          </a:prstGeom>
+          <a:solidFill>
+            <a:srgbClr val="5B9BD5">
+              <a:lumMod val="50000"/>
+            </a:srgbClr>
+          </a:solidFill>
+          <a:ln w="12700" cap="flat" cmpd="sng" algn="ctr">
+            <a:solidFill>
+              <a:srgbClr val="002060"/>
+            </a:solidFill>
+            <a:prstDash val="solid"/>
+            <a:miter lim="800000"/>
+          </a:ln>
+          <a:effectLst/>
+        </p:spPr>
+        <p:txBody>
+          <a:bodyPr lIns="91427" tIns="45713" rIns="91427" bIns="45713" rtlCol="0" anchor="ctr"/>
+          <a:lstStyle/>
+          <a:p>
+            <a:pPr marL="0" marR="0" lvl="0" indent="0" defTabSz="914225" eaLnBrk="1" fontAlgn="auto" latinLnBrk="0" hangingPunct="1">
+              <a:lnSpc>
+                <a:spcPct val="100000"/>
+              </a:lnSpc>
+              <a:spcBef>
+                <a:spcPts val="0"/>
+              </a:spcBef>
+              <a:spcAft>
+                <a:spcPts val="0"/>
+              </a:spcAft>
+              <a:buClrTx/>
+              <a:buSzTx/>
+              <a:buFontTx/>
+              <a:buNone/>
+              <a:tabLst/>
+              <a:defRPr/>
+            </a:pPr>
+            <a:r>
+              <a:rPr kumimoji="0" lang="en-US" sz="1400" b="0" i="0" u="none" strike="noStrike" kern="0" cap="none" spc="0" normalizeH="0" baseline="0" noProof="0" dirty="0">
+                <a:ln>
+                  <a:noFill/>
+                </a:ln>
+                <a:solidFill>
+                  <a:srgbClr val="FFFFFF"/>
+                </a:solidFill>
+                <a:effectLst/>
+                <a:uLnTx/>
+                <a:uFillTx/>
+                <a:latin typeface="Calibri" panose="020F0502020204030204"/>
+                <a:ea typeface="+mn-ea"/>
+                <a:cs typeface="+mn-cs"/>
+              </a:rPr>
+              <a:t>THEME/FOCUS AREA								DSR Owner:  </a:t>
+            </a:r>
+            <a:r>
+              <a:rPr kumimoji="0" lang="en-US" sz="1400" b="0" i="0" u="none" strike="noStrike" kern="0" cap="none" spc="0" normalizeH="0" baseline="0" noProof="0" dirty="0">
+                <a:ln>
+                  <a:noFill/>
+                </a:ln>
+                <a:solidFill>
+                  <a:srgbClr val="FFC000"/>
+                </a:solidFill>
+                <a:effectLst/>
+                <a:uLnTx/>
+                <a:uFillTx/>
+                <a:latin typeface="Calibri" panose="020F0502020204030204"/>
+                <a:ea typeface="+mn-ea"/>
+                <a:cs typeface="+mn-cs"/>
+              </a:rPr>
+              <a:t>Assign Theme Owner</a:t>
+            </a:r>
+            <a:r>
+              <a:rPr kumimoji="0" lang="en-US" sz="1400" b="0" i="0" u="none" strike="noStrike" kern="0" cap="none" spc="0" normalizeH="0" baseline="0" noProof="0" dirty="0">
+                <a:ln>
+                  <a:noFill/>
+                </a:ln>
+                <a:solidFill>
+                  <a:srgbClr val="FFFFFF"/>
+                </a:solidFill>
+                <a:effectLst/>
+                <a:uLnTx/>
+                <a:uFillTx/>
+                <a:latin typeface="Calibri" panose="020F0502020204030204"/>
+                <a:ea typeface="+mn-ea"/>
+                <a:cs typeface="+mn-cs"/>
+              </a:rPr>
+              <a:t> </a:t>
+            </a:r>
+            <a:endParaRPr kumimoji="0" lang="en-US" sz="1800" b="0" i="0" u="none" strike="noStrike" kern="0" cap="none" spc="0" normalizeH="0" baseline="0" noProof="0" dirty="0">
+              <a:ln>
+                <a:noFill/>
+              </a:ln>
+              <a:solidFill>
+                <a:prstClr val="white"/>
+              </a:solidFill>
+              <a:effectLst/>
+              <a:uLnTx/>
+              <a:uFillTx/>
+              <a:latin typeface="Calibri" panose="020F0502020204030204"/>
+              <a:ea typeface="+mn-ea"/>
+              <a:cs typeface="+mn-cs"/>
+            </a:endParaRPr>
+          </a:p>
+        </p:txBody>
+      </p:sp>
+      <p:sp>
+        <p:nvSpPr>
+          <p:cNvPr id="6" name="TextBox 5">
+            <a:extLst>
+              <a:ext uri="{FF2B5EF4-FFF2-40B4-BE49-F238E27FC236}">
+                <a16:creationId xmlns:a16="http://schemas.microsoft.com/office/drawing/2014/main" id="{0873095B-3FF1-3328-2633-1F5A74530407}"/>
+              </a:ext>
+            </a:extLst>
+          </p:cNvPr>
+          <p:cNvSpPr txBox="1"/>
+          <p:nvPr userDrawn="1"/>
+        </p:nvSpPr>
+        <p:spPr>
+          <a:xfrm>
+            <a:off x="0" y="350432"/>
+            <a:ext cx="5201080" cy="646331"/>
+          </a:xfrm>
+          <a:prstGeom prst="rect">
+            <a:avLst/>
+          </a:prstGeom>
+          <a:solidFill>
+            <a:schemeClr val="bg2">
+              <a:lumMod val="90000"/>
+            </a:schemeClr>
+          </a:solidFill>
+        </p:spPr>
+        <p:txBody>
+          <a:bodyPr wrap="square" rtlCol="0">
+            <a:spAutoFit/>
+          </a:bodyPr>
+          <a:lstStyle/>
+          <a:p>
+            <a:r>
+              <a:rPr lang="en-US" dirty="0"/>
+              <a:t>Short blurb/story behind the ask and what are the end goals for this theme</a:t>
+            </a:r>
+          </a:p>
+        </p:txBody>
+      </p:sp>
     </p:spTree>
     <p:extLst>
       <p:ext uri="{BB962C8B-B14F-4D97-AF65-F5344CB8AC3E}">
@@ -3037,7 +3145,7 @@
 
 <file path=ppt/slideLayouts/slideLayout6.xml><?xml version="1.0" encoding="utf-8"?>
 <p:sldLayout xmlns:a="http://schemas.openxmlformats.org/drawingml/2006/main" xmlns:r="http://schemas.openxmlformats.org/officeDocument/2006/relationships" xmlns:p="http://schemas.openxmlformats.org/presentationml/2006/main" preserve="1" userDrawn="1">
-  <p:cSld name="2_Title and Content">
+  <p:cSld name="3_Title and Content">
     <p:spTree>
       <p:nvGrpSpPr>
         <p:cNvPr id="1" name=""/>
@@ -3052,60 +3160,214 @@
           <a:chExt cx="0" cy="0"/>
         </a:xfrm>
       </p:grpSpPr>
-      <p:sp>
-        <p:nvSpPr>
-          <p:cNvPr id="4" name="Title 1">
+      <p:graphicFrame>
+        <p:nvGraphicFramePr>
+          <p:cNvPr id="27" name="Table 26">
             <a:extLst>
               <a:ext uri="{FF2B5EF4-FFF2-40B4-BE49-F238E27FC236}">
-                <a16:creationId xmlns:a16="http://schemas.microsoft.com/office/drawing/2014/main" id="{8AE8868F-6D8F-45AE-B298-D99C0E002CE5}"/>
+                <a16:creationId xmlns:a16="http://schemas.microsoft.com/office/drawing/2014/main" id="{D2815E22-2B87-4DE9-ABEC-6CC9D23A9481}"/>
               </a:ext>
             </a:extLst>
           </p:cNvPr>
-          <p:cNvSpPr>
-            <a:spLocks noGrp="1"/>
-          </p:cNvSpPr>
-          <p:nvPr>
-            <p:ph type="title"/>
+          <p:cNvGraphicFramePr>
+            <a:graphicFrameLocks noGrp="1"/>
+          </p:cNvGraphicFramePr>
+          <p:nvPr userDrawn="1">
+            <p:extLst>
+              <p:ext uri="{D42A27DB-BD31-4B8C-83A1-F6EECF244321}">
+                <p14:modId xmlns:p14="http://schemas.microsoft.com/office/powerpoint/2010/main" val="3990518215"/>
+              </p:ext>
+            </p:extLst>
           </p:nvPr>
-        </p:nvSpPr>
-        <p:spPr>
-          <a:xfrm>
-            <a:off x="-1" y="2366"/>
-            <a:ext cx="5193133" cy="582250"/>
-          </a:xfrm>
-          <a:solidFill>
-            <a:schemeClr val="bg1">
-              <a:lumMod val="95000"/>
-            </a:schemeClr>
-          </a:solidFill>
-        </p:spPr>
-        <p:txBody>
-          <a:bodyPr vert="horz" wrap="square" lIns="146284" tIns="91427" rIns="146284" bIns="91427" rtlCol="0" anchor="t">
-            <a:noAutofit/>
-          </a:bodyPr>
-          <a:lstStyle/>
-          <a:p>
-            <a:pPr defTabSz="914367">
-              <a:lnSpc>
-                <a:spcPct val="90000"/>
-              </a:lnSpc>
-            </a:pPr>
-            <a:endParaRPr lang="en-US" sz="2400" b="0" spc="-100" dirty="0">
-              <a:gradFill>
-                <a:gsLst>
-                  <a:gs pos="2917">
-                    <a:schemeClr val="tx1"/>
-                  </a:gs>
-                  <a:gs pos="30000">
-                    <a:schemeClr val="tx1"/>
-                  </a:gs>
-                </a:gsLst>
-                <a:lin ang="5400000" scaled="0"/>
-              </a:gradFill>
-            </a:endParaRPr>
-          </a:p>
-        </p:txBody>
-      </p:sp>
+        </p:nvGraphicFramePr>
+        <p:xfrm>
+          <a:off x="6363216" y="636771"/>
+          <a:ext cx="1150721" cy="296458"/>
+        </p:xfrm>
+        <a:graphic>
+          <a:graphicData uri="http://schemas.openxmlformats.org/drawingml/2006/table">
+            <a:tbl>
+              <a:tblPr firstRow="1" bandRow="1"/>
+              <a:tblGrid>
+                <a:gridCol w="1150721">
+                  <a:extLst>
+                    <a:ext uri="{9D8B030D-6E8A-4147-A177-3AD203B41FA5}">
+                      <a16:colId xmlns:a16="http://schemas.microsoft.com/office/drawing/2014/main" val="20000"/>
+                    </a:ext>
+                  </a:extLst>
+                </a:gridCol>
+              </a:tblGrid>
+              <a:tr h="296458">
+                <a:tc>
+                  <a:txBody>
+                    <a:bodyPr/>
+                    <a:lstStyle>
+                      <a:lvl1pPr marL="0" algn="l" defTabSz="932742" rtl="0" eaLnBrk="1" latinLnBrk="0" hangingPunct="1">
+                        <a:defRPr sz="1800" b="1" kern="1200">
+                          <a:solidFill>
+                            <a:schemeClr val="lt1"/>
+                          </a:solidFill>
+                          <a:latin typeface="Calibri" panose="020F0502020204030204"/>
+                        </a:defRPr>
+                      </a:lvl1pPr>
+                      <a:lvl2pPr marL="466371" algn="l" defTabSz="932742" rtl="0" eaLnBrk="1" latinLnBrk="0" hangingPunct="1">
+                        <a:defRPr sz="1800" b="1" kern="1200">
+                          <a:solidFill>
+                            <a:schemeClr val="lt1"/>
+                          </a:solidFill>
+                          <a:latin typeface="Calibri" panose="020F0502020204030204"/>
+                        </a:defRPr>
+                      </a:lvl2pPr>
+                      <a:lvl3pPr marL="932742" algn="l" defTabSz="932742" rtl="0" eaLnBrk="1" latinLnBrk="0" hangingPunct="1">
+                        <a:defRPr sz="1800" b="1" kern="1200">
+                          <a:solidFill>
+                            <a:schemeClr val="lt1"/>
+                          </a:solidFill>
+                          <a:latin typeface="Calibri" panose="020F0502020204030204"/>
+                        </a:defRPr>
+                      </a:lvl3pPr>
+                      <a:lvl4pPr marL="1399113" algn="l" defTabSz="932742" rtl="0" eaLnBrk="1" latinLnBrk="0" hangingPunct="1">
+                        <a:defRPr sz="1800" b="1" kern="1200">
+                          <a:solidFill>
+                            <a:schemeClr val="lt1"/>
+                          </a:solidFill>
+                          <a:latin typeface="Calibri" panose="020F0502020204030204"/>
+                        </a:defRPr>
+                      </a:lvl4pPr>
+                      <a:lvl5pPr marL="1865484" algn="l" defTabSz="932742" rtl="0" eaLnBrk="1" latinLnBrk="0" hangingPunct="1">
+                        <a:defRPr sz="1800" b="1" kern="1200">
+                          <a:solidFill>
+                            <a:schemeClr val="lt1"/>
+                          </a:solidFill>
+                          <a:latin typeface="Calibri" panose="020F0502020204030204"/>
+                        </a:defRPr>
+                      </a:lvl5pPr>
+                      <a:lvl6pPr marL="2331856" algn="l" defTabSz="932742" rtl="0" eaLnBrk="1" latinLnBrk="0" hangingPunct="1">
+                        <a:defRPr sz="1800" b="1" kern="1200">
+                          <a:solidFill>
+                            <a:schemeClr val="lt1"/>
+                          </a:solidFill>
+                          <a:latin typeface="Calibri" panose="020F0502020204030204"/>
+                        </a:defRPr>
+                      </a:lvl6pPr>
+                      <a:lvl7pPr marL="2798226" algn="l" defTabSz="932742" rtl="0" eaLnBrk="1" latinLnBrk="0" hangingPunct="1">
+                        <a:defRPr sz="1800" b="1" kern="1200">
+                          <a:solidFill>
+                            <a:schemeClr val="lt1"/>
+                          </a:solidFill>
+                          <a:latin typeface="Calibri" panose="020F0502020204030204"/>
+                        </a:defRPr>
+                      </a:lvl7pPr>
+                      <a:lvl8pPr marL="3264597" algn="l" defTabSz="932742" rtl="0" eaLnBrk="1" latinLnBrk="0" hangingPunct="1">
+                        <a:defRPr sz="1800" b="1" kern="1200">
+                          <a:solidFill>
+                            <a:schemeClr val="lt1"/>
+                          </a:solidFill>
+                          <a:latin typeface="Calibri" panose="020F0502020204030204"/>
+                        </a:defRPr>
+                      </a:lvl8pPr>
+                      <a:lvl9pPr marL="3730969" algn="l" defTabSz="932742" rtl="0" eaLnBrk="1" latinLnBrk="0" hangingPunct="1">
+                        <a:defRPr sz="1800" b="1" kern="1200">
+                          <a:solidFill>
+                            <a:schemeClr val="lt1"/>
+                          </a:solidFill>
+                          <a:latin typeface="Calibri" panose="020F0502020204030204"/>
+                        </a:defRPr>
+                      </a:lvl9pPr>
+                    </a:lstStyle>
+                    <a:p>
+                      <a:pPr marL="0" marR="0" indent="0" algn="r" defTabSz="1462981" rtl="0" eaLnBrk="1" fontAlgn="auto" latinLnBrk="0" hangingPunct="1">
+                        <a:lnSpc>
+                          <a:spcPct val="100000"/>
+                        </a:lnSpc>
+                        <a:spcBef>
+                          <a:spcPts val="0"/>
+                        </a:spcBef>
+                        <a:spcAft>
+                          <a:spcPts val="0"/>
+                        </a:spcAft>
+                        <a:buClrTx/>
+                        <a:buSzTx/>
+                        <a:buFontTx/>
+                        <a:buNone/>
+                        <a:tabLst/>
+                        <a:defRPr/>
+                      </a:pPr>
+                      <a:r>
+                        <a:rPr lang="en-US" sz="800" b="0" dirty="0">
+                          <a:solidFill>
+                            <a:srgbClr val="000000"/>
+                          </a:solidFill>
+                          <a:latin typeface="Calibri" panose="020F0502020204030204" pitchFamily="34" charset="0"/>
+                        </a:rPr>
+                        <a:t>Discuss Prioritization</a:t>
+                      </a:r>
+                      <a:endParaRPr lang="en-US" sz="800" b="0" dirty="0">
+                        <a:solidFill>
+                          <a:schemeClr val="bg1"/>
+                        </a:solidFill>
+                        <a:latin typeface="Calibri" panose="020F0502020204030204" pitchFamily="34" charset="0"/>
+                      </a:endParaRPr>
+                    </a:p>
+                  </a:txBody>
+                  <a:tcPr marL="61111" marR="61111" marT="30555" marB="30555" anchor="ctr">
+                    <a:lnL w="12700" cap="flat" cmpd="sng" algn="ctr">
+                      <a:solidFill>
+                        <a:sysClr val="windowText" lastClr="000000"/>
+                      </a:solidFill>
+                      <a:prstDash val="solid"/>
+                      <a:round/>
+                      <a:headEnd type="none" w="med" len="med"/>
+                      <a:tailEnd type="none" w="med" len="med"/>
+                    </a:lnL>
+                    <a:lnR w="12700" cap="flat" cmpd="sng" algn="ctr">
+                      <a:solidFill>
+                        <a:sysClr val="windowText" lastClr="000000"/>
+                      </a:solidFill>
+                      <a:prstDash val="solid"/>
+                      <a:round/>
+                      <a:headEnd type="none" w="med" len="med"/>
+                      <a:tailEnd type="none" w="med" len="med"/>
+                    </a:lnR>
+                    <a:lnT w="12700" cap="flat" cmpd="sng" algn="ctr">
+                      <a:solidFill>
+                        <a:sysClr val="windowText" lastClr="000000"/>
+                      </a:solidFill>
+                      <a:prstDash val="solid"/>
+                      <a:round/>
+                      <a:headEnd type="none" w="med" len="med"/>
+                      <a:tailEnd type="none" w="med" len="med"/>
+                    </a:lnT>
+                    <a:lnB w="12700" cap="flat" cmpd="sng" algn="ctr">
+                      <a:solidFill>
+                        <a:sysClr val="windowText" lastClr="000000"/>
+                      </a:solidFill>
+                      <a:prstDash val="solid"/>
+                      <a:round/>
+                      <a:headEnd type="none" w="med" len="med"/>
+                      <a:tailEnd type="none" w="med" len="med"/>
+                    </a:lnB>
+                    <a:lnTlToBr w="12700" cmpd="sng">
+                      <a:noFill/>
+                      <a:prstDash val="solid"/>
+                    </a:lnTlToBr>
+                    <a:lnBlToTr w="12700" cmpd="sng">
+                      <a:noFill/>
+                      <a:prstDash val="solid"/>
+                    </a:lnBlToTr>
+                    <a:noFill/>
+                  </a:tcPr>
+                </a:tc>
+                <a:extLst>
+                  <a:ext uri="{0D108BD9-81ED-4DB2-BD59-A6C34878D82A}">
+                    <a16:rowId xmlns:a16="http://schemas.microsoft.com/office/drawing/2014/main" val="10000"/>
+                  </a:ext>
+                </a:extLst>
+              </a:tr>
+            </a:tbl>
+          </a:graphicData>
+        </a:graphic>
+      </p:graphicFrame>
       <p:grpSp>
         <p:nvGrpSpPr>
           <p:cNvPr id="7" name="Group 6" descr="Status Legend group">
@@ -3120,7 +3382,7 @@
         </p:nvGrpSpPr>
         <p:grpSpPr>
           <a:xfrm>
-            <a:off x="7504770" y="-4291"/>
+            <a:off x="7507486" y="350432"/>
             <a:ext cx="4667415" cy="588907"/>
             <a:chOff x="7159083" y="-867193"/>
             <a:chExt cx="4667415" cy="461667"/>
@@ -3623,10 +3885,10 @@
       </p:grpSp>
       <p:graphicFrame>
         <p:nvGraphicFramePr>
-          <p:cNvPr id="2" name="Table 1">
+          <p:cNvPr id="24" name="Table 23">
             <a:extLst>
               <a:ext uri="{FF2B5EF4-FFF2-40B4-BE49-F238E27FC236}">
-                <a16:creationId xmlns:a16="http://schemas.microsoft.com/office/drawing/2014/main" id="{891F3691-B896-4F74-B199-4132959C2332}"/>
+                <a16:creationId xmlns:a16="http://schemas.microsoft.com/office/drawing/2014/main" id="{CD401FA0-66B9-432F-B5AE-E327DE58C6DC}"/>
               </a:ext>
             </a:extLst>
           </p:cNvPr>
@@ -3636,13 +3898,13 @@
           <p:nvPr userDrawn="1">
             <p:extLst>
               <p:ext uri="{D42A27DB-BD31-4B8C-83A1-F6EECF244321}">
-                <p14:modId xmlns:p14="http://schemas.microsoft.com/office/powerpoint/2010/main" val="3389612277"/>
+                <p14:modId xmlns:p14="http://schemas.microsoft.com/office/powerpoint/2010/main" val="169841313"/>
               </p:ext>
             </p:extLst>
           </p:nvPr>
         </p:nvGraphicFramePr>
         <p:xfrm>
-          <a:off x="5215536" y="-1740"/>
+          <a:off x="5225455" y="340216"/>
           <a:ext cx="1130558" cy="296459"/>
         </p:xfrm>
         <a:graphic>
@@ -3831,10 +4093,10 @@
       </p:graphicFrame>
       <p:graphicFrame>
         <p:nvGraphicFramePr>
-          <p:cNvPr id="3" name="Table 2">
+          <p:cNvPr id="25" name="Table 24">
             <a:extLst>
               <a:ext uri="{FF2B5EF4-FFF2-40B4-BE49-F238E27FC236}">
-                <a16:creationId xmlns:a16="http://schemas.microsoft.com/office/drawing/2014/main" id="{F1D9E625-AFD3-4FBD-84FA-CE0DCA393CE2}"/>
+                <a16:creationId xmlns:a16="http://schemas.microsoft.com/office/drawing/2014/main" id="{90A3E32D-5BDB-4ECD-A5B5-272F38A74DF7}"/>
               </a:ext>
             </a:extLst>
           </p:cNvPr>
@@ -3844,13 +4106,13 @@
           <p:nvPr userDrawn="1">
             <p:extLst>
               <p:ext uri="{D42A27DB-BD31-4B8C-83A1-F6EECF244321}">
-                <p14:modId xmlns:p14="http://schemas.microsoft.com/office/powerpoint/2010/main" val="658212596"/>
+                <p14:modId xmlns:p14="http://schemas.microsoft.com/office/powerpoint/2010/main" val="3648508608"/>
               </p:ext>
             </p:extLst>
           </p:nvPr>
         </p:nvGraphicFramePr>
         <p:xfrm>
-          <a:off x="6359234" y="2366"/>
+          <a:off x="6369153" y="344322"/>
           <a:ext cx="1138333" cy="296458"/>
         </p:xfrm>
         <a:graphic>
@@ -4037,220 +4299,12 @@
           </a:graphicData>
         </a:graphic>
       </p:graphicFrame>
-      <p:graphicFrame>
-        <p:nvGraphicFramePr>
-          <p:cNvPr id="5" name="Table 4">
+      <p:pic>
+        <p:nvPicPr>
+          <p:cNvPr id="26" name="Graphic 25" descr="Exclamation mark with solid fill">
             <a:extLst>
               <a:ext uri="{FF2B5EF4-FFF2-40B4-BE49-F238E27FC236}">
-                <a16:creationId xmlns:a16="http://schemas.microsoft.com/office/drawing/2014/main" id="{616A5F5C-DA2D-49B5-A9CC-FE30F6D0BF2B}"/>
-              </a:ext>
-            </a:extLst>
-          </p:cNvPr>
-          <p:cNvGraphicFramePr>
-            <a:graphicFrameLocks noGrp="1"/>
-          </p:cNvGraphicFramePr>
-          <p:nvPr userDrawn="1">
-            <p:extLst>
-              <p:ext uri="{D42A27DB-BD31-4B8C-83A1-F6EECF244321}">
-                <p14:modId xmlns:p14="http://schemas.microsoft.com/office/powerpoint/2010/main" val="2754780342"/>
-              </p:ext>
-            </p:extLst>
-          </p:nvPr>
-        </p:nvGraphicFramePr>
-        <p:xfrm>
-          <a:off x="6353297" y="294815"/>
-          <a:ext cx="1150721" cy="296458"/>
-        </p:xfrm>
-        <a:graphic>
-          <a:graphicData uri="http://schemas.openxmlformats.org/drawingml/2006/table">
-            <a:tbl>
-              <a:tblPr firstRow="1" bandRow="1"/>
-              <a:tblGrid>
-                <a:gridCol w="1150721">
-                  <a:extLst>
-                    <a:ext uri="{9D8B030D-6E8A-4147-A177-3AD203B41FA5}">
-                      <a16:colId xmlns:a16="http://schemas.microsoft.com/office/drawing/2014/main" val="20000"/>
-                    </a:ext>
-                  </a:extLst>
-                </a:gridCol>
-              </a:tblGrid>
-              <a:tr h="296458">
-                <a:tc>
-                  <a:txBody>
-                    <a:bodyPr/>
-                    <a:lstStyle>
-                      <a:lvl1pPr marL="0" algn="l" defTabSz="932742" rtl="0" eaLnBrk="1" latinLnBrk="0" hangingPunct="1">
-                        <a:defRPr sz="1800" b="1" kern="1200">
-                          <a:solidFill>
-                            <a:schemeClr val="lt1"/>
-                          </a:solidFill>
-                          <a:latin typeface="Calibri" panose="020F0502020204030204"/>
-                        </a:defRPr>
-                      </a:lvl1pPr>
-                      <a:lvl2pPr marL="466371" algn="l" defTabSz="932742" rtl="0" eaLnBrk="1" latinLnBrk="0" hangingPunct="1">
-                        <a:defRPr sz="1800" b="1" kern="1200">
-                          <a:solidFill>
-                            <a:schemeClr val="lt1"/>
-                          </a:solidFill>
-                          <a:latin typeface="Calibri" panose="020F0502020204030204"/>
-                        </a:defRPr>
-                      </a:lvl2pPr>
-                      <a:lvl3pPr marL="932742" algn="l" defTabSz="932742" rtl="0" eaLnBrk="1" latinLnBrk="0" hangingPunct="1">
-                        <a:defRPr sz="1800" b="1" kern="1200">
-                          <a:solidFill>
-                            <a:schemeClr val="lt1"/>
-                          </a:solidFill>
-                          <a:latin typeface="Calibri" panose="020F0502020204030204"/>
-                        </a:defRPr>
-                      </a:lvl3pPr>
-                      <a:lvl4pPr marL="1399113" algn="l" defTabSz="932742" rtl="0" eaLnBrk="1" latinLnBrk="0" hangingPunct="1">
-                        <a:defRPr sz="1800" b="1" kern="1200">
-                          <a:solidFill>
-                            <a:schemeClr val="lt1"/>
-                          </a:solidFill>
-                          <a:latin typeface="Calibri" panose="020F0502020204030204"/>
-                        </a:defRPr>
-                      </a:lvl4pPr>
-                      <a:lvl5pPr marL="1865484" algn="l" defTabSz="932742" rtl="0" eaLnBrk="1" latinLnBrk="0" hangingPunct="1">
-                        <a:defRPr sz="1800" b="1" kern="1200">
-                          <a:solidFill>
-                            <a:schemeClr val="lt1"/>
-                          </a:solidFill>
-                          <a:latin typeface="Calibri" panose="020F0502020204030204"/>
-                        </a:defRPr>
-                      </a:lvl5pPr>
-                      <a:lvl6pPr marL="2331856" algn="l" defTabSz="932742" rtl="0" eaLnBrk="1" latinLnBrk="0" hangingPunct="1">
-                        <a:defRPr sz="1800" b="1" kern="1200">
-                          <a:solidFill>
-                            <a:schemeClr val="lt1"/>
-                          </a:solidFill>
-                          <a:latin typeface="Calibri" panose="020F0502020204030204"/>
-                        </a:defRPr>
-                      </a:lvl6pPr>
-                      <a:lvl7pPr marL="2798226" algn="l" defTabSz="932742" rtl="0" eaLnBrk="1" latinLnBrk="0" hangingPunct="1">
-                        <a:defRPr sz="1800" b="1" kern="1200">
-                          <a:solidFill>
-                            <a:schemeClr val="lt1"/>
-                          </a:solidFill>
-                          <a:latin typeface="Calibri" panose="020F0502020204030204"/>
-                        </a:defRPr>
-                      </a:lvl7pPr>
-                      <a:lvl8pPr marL="3264597" algn="l" defTabSz="932742" rtl="0" eaLnBrk="1" latinLnBrk="0" hangingPunct="1">
-                        <a:defRPr sz="1800" b="1" kern="1200">
-                          <a:solidFill>
-                            <a:schemeClr val="lt1"/>
-                          </a:solidFill>
-                          <a:latin typeface="Calibri" panose="020F0502020204030204"/>
-                        </a:defRPr>
-                      </a:lvl8pPr>
-                      <a:lvl9pPr marL="3730969" algn="l" defTabSz="932742" rtl="0" eaLnBrk="1" latinLnBrk="0" hangingPunct="1">
-                        <a:defRPr sz="1800" b="1" kern="1200">
-                          <a:solidFill>
-                            <a:schemeClr val="lt1"/>
-                          </a:solidFill>
-                          <a:latin typeface="Calibri" panose="020F0502020204030204"/>
-                        </a:defRPr>
-                      </a:lvl9pPr>
-                    </a:lstStyle>
-                    <a:p>
-                      <a:pPr marL="0" marR="0" indent="0" algn="r" defTabSz="1462981" rtl="0" eaLnBrk="1" fontAlgn="auto" latinLnBrk="0" hangingPunct="1">
-                        <a:lnSpc>
-                          <a:spcPct val="100000"/>
-                        </a:lnSpc>
-                        <a:spcBef>
-                          <a:spcPts val="0"/>
-                        </a:spcBef>
-                        <a:spcAft>
-                          <a:spcPts val="0"/>
-                        </a:spcAft>
-                        <a:buClrTx/>
-                        <a:buSzTx/>
-                        <a:buFontTx/>
-                        <a:buNone/>
-                        <a:tabLst/>
-                        <a:defRPr/>
-                      </a:pPr>
-                      <a:r>
-                        <a:rPr lang="en-US" sz="800" b="0" dirty="0">
-                          <a:solidFill>
-                            <a:srgbClr val="000000"/>
-                          </a:solidFill>
-                          <a:latin typeface="Calibri" panose="020F0502020204030204" pitchFamily="34" charset="0"/>
-                        </a:rPr>
-                        <a:t>Discuss Prioritization</a:t>
-                      </a:r>
-                      <a:endParaRPr lang="en-US" sz="800" b="0" dirty="0">
-                        <a:solidFill>
-                          <a:schemeClr val="bg1"/>
-                        </a:solidFill>
-                        <a:latin typeface="Calibri" panose="020F0502020204030204" pitchFamily="34" charset="0"/>
-                      </a:endParaRPr>
-                    </a:p>
-                  </a:txBody>
-                  <a:tcPr marL="61111" marR="61111" marT="30555" marB="30555" anchor="ctr">
-                    <a:lnL w="12700" cap="flat" cmpd="sng" algn="ctr">
-                      <a:solidFill>
-                        <a:sysClr val="windowText" lastClr="000000"/>
-                      </a:solidFill>
-                      <a:prstDash val="solid"/>
-                      <a:round/>
-                      <a:headEnd type="none" w="med" len="med"/>
-                      <a:tailEnd type="none" w="med" len="med"/>
-                    </a:lnL>
-                    <a:lnR w="12700" cap="flat" cmpd="sng" algn="ctr">
-                      <a:solidFill>
-                        <a:sysClr val="windowText" lastClr="000000"/>
-                      </a:solidFill>
-                      <a:prstDash val="solid"/>
-                      <a:round/>
-                      <a:headEnd type="none" w="med" len="med"/>
-                      <a:tailEnd type="none" w="med" len="med"/>
-                    </a:lnR>
-                    <a:lnT w="12700" cap="flat" cmpd="sng" algn="ctr">
-                      <a:solidFill>
-                        <a:sysClr val="windowText" lastClr="000000"/>
-                      </a:solidFill>
-                      <a:prstDash val="solid"/>
-                      <a:round/>
-                      <a:headEnd type="none" w="med" len="med"/>
-                      <a:tailEnd type="none" w="med" len="med"/>
-                    </a:lnT>
-                    <a:lnB w="12700" cap="flat" cmpd="sng" algn="ctr">
-                      <a:solidFill>
-                        <a:sysClr val="windowText" lastClr="000000"/>
-                      </a:solidFill>
-                      <a:prstDash val="solid"/>
-                      <a:round/>
-                      <a:headEnd type="none" w="med" len="med"/>
-                      <a:tailEnd type="none" w="med" len="med"/>
-                    </a:lnB>
-                    <a:lnTlToBr w="12700" cmpd="sng">
-                      <a:noFill/>
-                      <a:prstDash val="solid"/>
-                    </a:lnTlToBr>
-                    <a:lnBlToTr w="12700" cmpd="sng">
-                      <a:noFill/>
-                      <a:prstDash val="solid"/>
-                    </a:lnBlToTr>
-                    <a:noFill/>
-                  </a:tcPr>
-                </a:tc>
-                <a:extLst>
-                  <a:ext uri="{0D108BD9-81ED-4DB2-BD59-A6C34878D82A}">
-                    <a16:rowId xmlns:a16="http://schemas.microsoft.com/office/drawing/2014/main" val="10000"/>
-                  </a:ext>
-                </a:extLst>
-              </a:tr>
-            </a:tbl>
-          </a:graphicData>
-        </a:graphic>
-      </p:graphicFrame>
-      <p:pic>
-        <p:nvPicPr>
-          <p:cNvPr id="6" name="Graphic 5" descr="Repeat with solid fill">
-            <a:extLst>
-              <a:ext uri="{FF2B5EF4-FFF2-40B4-BE49-F238E27FC236}">
-                <a16:creationId xmlns:a16="http://schemas.microsoft.com/office/drawing/2014/main" id="{16568AF9-5A19-4C08-8102-DD75F097A9DF}"/>
+                <a16:creationId xmlns:a16="http://schemas.microsoft.com/office/drawing/2014/main" id="{44D41467-AEB2-46E8-8BA1-61D4AC155257}"/>
               </a:ext>
             </a:extLst>
           </p:cNvPr>
@@ -4276,8 +4330,8 @@
         </p:blipFill>
         <p:spPr>
           <a:xfrm>
-            <a:off x="6374995" y="47948"/>
-            <a:ext cx="208359" cy="208359"/>
+            <a:off x="6349332" y="636391"/>
+            <a:ext cx="279521" cy="296838"/>
           </a:xfrm>
           <a:prstGeom prst="rect">
             <a:avLst/>
@@ -4286,10 +4340,10 @@
       </p:pic>
       <p:pic>
         <p:nvPicPr>
-          <p:cNvPr id="19" name="Graphic 18" descr="Follow with solid fill">
+          <p:cNvPr id="28" name="Graphic 27" descr="Repeat with solid fill">
             <a:extLst>
               <a:ext uri="{FF2B5EF4-FFF2-40B4-BE49-F238E27FC236}">
-                <a16:creationId xmlns:a16="http://schemas.microsoft.com/office/drawing/2014/main" id="{D0062EC0-5719-463F-9C92-1C57EA86D2C4}"/>
+                <a16:creationId xmlns:a16="http://schemas.microsoft.com/office/drawing/2014/main" id="{D1BCB357-608D-475F-95F9-A7A8DCA54371}"/>
               </a:ext>
             </a:extLst>
           </p:cNvPr>
@@ -4315,8 +4369,8 @@
         </p:blipFill>
         <p:spPr>
           <a:xfrm>
-            <a:off x="5208333" y="0"/>
-            <a:ext cx="304917" cy="304917"/>
+            <a:off x="6384914" y="389904"/>
+            <a:ext cx="208359" cy="208359"/>
           </a:xfrm>
           <a:prstGeom prst="rect">
             <a:avLst/>
@@ -4325,10 +4379,10 @@
       </p:pic>
       <p:pic>
         <p:nvPicPr>
-          <p:cNvPr id="21" name="Graphic 20" descr="Exclamation mark with solid fill">
+          <p:cNvPr id="29" name="Graphic 28" descr="Follow with solid fill">
             <a:extLst>
               <a:ext uri="{FF2B5EF4-FFF2-40B4-BE49-F238E27FC236}">
-                <a16:creationId xmlns:a16="http://schemas.microsoft.com/office/drawing/2014/main" id="{7DB55A9D-4DA0-4F8C-AD16-C9A0AB7E5739}"/>
+                <a16:creationId xmlns:a16="http://schemas.microsoft.com/office/drawing/2014/main" id="{865AF05E-893F-41AD-ABDD-B47025E9279D}"/>
               </a:ext>
             </a:extLst>
           </p:cNvPr>
@@ -4354,18 +4408,180 @@
         </p:blipFill>
         <p:spPr>
           <a:xfrm>
-            <a:off x="6339413" y="294435"/>
-            <a:ext cx="279521" cy="296838"/>
+            <a:off x="5218252" y="341956"/>
+            <a:ext cx="304917" cy="304917"/>
           </a:xfrm>
           <a:prstGeom prst="rect">
             <a:avLst/>
           </a:prstGeom>
         </p:spPr>
       </p:pic>
+      <p:sp>
+        <p:nvSpPr>
+          <p:cNvPr id="5" name="Rectangle 4">
+            <a:extLst>
+              <a:ext uri="{FF2B5EF4-FFF2-40B4-BE49-F238E27FC236}">
+                <a16:creationId xmlns:a16="http://schemas.microsoft.com/office/drawing/2014/main" id="{B158F4A1-B86C-0327-7C90-119A9CCCBFB8}"/>
+              </a:ext>
+            </a:extLst>
+          </p:cNvPr>
+          <p:cNvSpPr/>
+          <p:nvPr userDrawn="1"/>
+        </p:nvSpPr>
+        <p:spPr>
+          <a:xfrm>
+            <a:off x="865" y="487"/>
+            <a:ext cx="12190271" cy="339729"/>
+          </a:xfrm>
+          <a:prstGeom prst="rect">
+            <a:avLst/>
+          </a:prstGeom>
+          <a:solidFill>
+            <a:srgbClr val="5B9BD5">
+              <a:lumMod val="50000"/>
+            </a:srgbClr>
+          </a:solidFill>
+          <a:ln w="12700" cap="flat" cmpd="sng" algn="ctr">
+            <a:solidFill>
+              <a:srgbClr val="002060"/>
+            </a:solidFill>
+            <a:prstDash val="solid"/>
+            <a:miter lim="800000"/>
+          </a:ln>
+          <a:effectLst/>
+        </p:spPr>
+        <p:txBody>
+          <a:bodyPr lIns="91427" tIns="45713" rIns="91427" bIns="45713" rtlCol="0" anchor="ctr"/>
+          <a:lstStyle/>
+          <a:p>
+            <a:pPr marL="0" marR="0" lvl="0" indent="0" defTabSz="914225" eaLnBrk="1" fontAlgn="auto" latinLnBrk="0" hangingPunct="1">
+              <a:lnSpc>
+                <a:spcPct val="100000"/>
+              </a:lnSpc>
+              <a:spcBef>
+                <a:spcPts val="0"/>
+              </a:spcBef>
+              <a:spcAft>
+                <a:spcPts val="0"/>
+              </a:spcAft>
+              <a:buClrTx/>
+              <a:buSzTx/>
+              <a:buFontTx/>
+              <a:buNone/>
+              <a:tabLst/>
+              <a:defRPr/>
+            </a:pPr>
+            <a:r>
+              <a:rPr kumimoji="0" lang="en-US" sz="1400" b="0" i="0" u="none" strike="noStrike" kern="0" cap="none" spc="0" normalizeH="0" baseline="0" noProof="0" dirty="0">
+                <a:ln>
+                  <a:noFill/>
+                </a:ln>
+                <a:solidFill>
+                  <a:srgbClr val="FFFFFF"/>
+                </a:solidFill>
+                <a:effectLst/>
+                <a:uLnTx/>
+                <a:uFillTx/>
+                <a:latin typeface="Calibri" panose="020F0502020204030204"/>
+                <a:ea typeface="+mn-ea"/>
+                <a:cs typeface="+mn-cs"/>
+              </a:rPr>
+              <a:t>THEME/FOCUS AREA								DSR Owner:  </a:t>
+            </a:r>
+            <a:r>
+              <a:rPr kumimoji="0" lang="en-US" sz="1400" b="0" i="0" u="none" strike="noStrike" kern="0" cap="none" spc="0" normalizeH="0" baseline="0" noProof="0" dirty="0">
+                <a:ln>
+                  <a:noFill/>
+                </a:ln>
+                <a:solidFill>
+                  <a:srgbClr val="FFC000"/>
+                </a:solidFill>
+                <a:effectLst/>
+                <a:uLnTx/>
+                <a:uFillTx/>
+                <a:latin typeface="Calibri" panose="020F0502020204030204"/>
+                <a:ea typeface="+mn-ea"/>
+                <a:cs typeface="+mn-cs"/>
+              </a:rPr>
+              <a:t>Assign Theme Owner</a:t>
+            </a:r>
+            <a:r>
+              <a:rPr kumimoji="0" lang="en-US" sz="1400" b="0" i="0" u="none" strike="noStrike" kern="0" cap="none" spc="0" normalizeH="0" baseline="0" noProof="0" dirty="0">
+                <a:ln>
+                  <a:noFill/>
+                </a:ln>
+                <a:solidFill>
+                  <a:srgbClr val="FFFFFF"/>
+                </a:solidFill>
+                <a:effectLst/>
+                <a:uLnTx/>
+                <a:uFillTx/>
+                <a:latin typeface="Calibri" panose="020F0502020204030204"/>
+                <a:ea typeface="+mn-ea"/>
+                <a:cs typeface="+mn-cs"/>
+              </a:rPr>
+              <a:t> </a:t>
+            </a:r>
+            <a:endParaRPr kumimoji="0" lang="en-US" sz="1800" b="0" i="0" u="none" strike="noStrike" kern="0" cap="none" spc="0" normalizeH="0" baseline="0" noProof="0" dirty="0">
+              <a:ln>
+                <a:noFill/>
+              </a:ln>
+              <a:solidFill>
+                <a:prstClr val="white"/>
+              </a:solidFill>
+              <a:effectLst/>
+              <a:uLnTx/>
+              <a:uFillTx/>
+              <a:latin typeface="Calibri" panose="020F0502020204030204"/>
+              <a:ea typeface="+mn-ea"/>
+              <a:cs typeface="+mn-cs"/>
+            </a:endParaRPr>
+          </a:p>
+        </p:txBody>
+      </p:sp>
+      <p:sp>
+        <p:nvSpPr>
+          <p:cNvPr id="6" name="TextBox 5">
+            <a:extLst>
+              <a:ext uri="{FF2B5EF4-FFF2-40B4-BE49-F238E27FC236}">
+                <a16:creationId xmlns:a16="http://schemas.microsoft.com/office/drawing/2014/main" id="{0873095B-3FF1-3328-2633-1F5A74530407}"/>
+              </a:ext>
+            </a:extLst>
+          </p:cNvPr>
+          <p:cNvSpPr txBox="1"/>
+          <p:nvPr userDrawn="1"/>
+        </p:nvSpPr>
+        <p:spPr>
+          <a:xfrm>
+            <a:off x="0" y="350432"/>
+            <a:ext cx="5201080" cy="646331"/>
+          </a:xfrm>
+          <a:prstGeom prst="rect">
+            <a:avLst/>
+          </a:prstGeom>
+          <a:solidFill>
+            <a:schemeClr val="bg2">
+              <a:lumMod val="90000"/>
+            </a:schemeClr>
+          </a:solidFill>
+        </p:spPr>
+        <p:txBody>
+          <a:bodyPr wrap="square" rtlCol="0">
+            <a:spAutoFit/>
+          </a:bodyPr>
+          <a:lstStyle/>
+          <a:p>
+            <a:r>
+              <a:rPr lang="en-US" dirty="0"/>
+              <a:t>Short blurb/story behind the ask and what are the end goals for this theme</a:t>
+            </a:r>
+          </a:p>
+        </p:txBody>
+      </p:sp>
     </p:spTree>
     <p:extLst>
       <p:ext uri="{BB962C8B-B14F-4D97-AF65-F5344CB8AC3E}">
-        <p14:creationId xmlns:p14="http://schemas.microsoft.com/office/powerpoint/2010/main" val="67071484"/>
+        <p14:creationId xmlns:p14="http://schemas.microsoft.com/office/powerpoint/2010/main" val="429339274"/>
       </p:ext>
     </p:extLst>
   </p:cSld>
@@ -6775,7 +6991,7 @@
     <p:sldLayoutId id="2147483667" r:id="rId3"/>
     <p:sldLayoutId id="2147483668" r:id="rId4"/>
     <p:sldLayoutId id="2147483669" r:id="rId5"/>
-    <p:sldLayoutId id="2147483674" r:id="rId6"/>
+    <p:sldLayoutId id="2147483675" r:id="rId6"/>
     <p:sldLayoutId id="2147483670" r:id="rId7"/>
     <p:sldLayoutId id="2147483671" r:id="rId8"/>
     <p:sldLayoutId id="2147483672" r:id="rId9"/>

</xml_diff>

<commit_message>
changed positioning of icons and key and extended the story column.
</commit_message>
<xml_diff>
--- a/script/RedZoneInput.pptx
+++ b/script/RedZoneInput.pptx
@@ -1673,13 +1673,13 @@
           <p:nvPr userDrawn="1">
             <p:extLst>
               <p:ext uri="{D42A27DB-BD31-4B8C-83A1-F6EECF244321}">
-                <p14:modId xmlns:p14="http://schemas.microsoft.com/office/powerpoint/2010/main" val="3990518215"/>
+                <p14:modId xmlns:p14="http://schemas.microsoft.com/office/powerpoint/2010/main" val="3249512282"/>
               </p:ext>
             </p:extLst>
           </p:nvPr>
         </p:nvGraphicFramePr>
         <p:xfrm>
-          <a:off x="6363216" y="636771"/>
+          <a:off x="5860950" y="6538483"/>
           <a:ext cx="1150721" cy="296458"/>
         </p:xfrm>
         <a:graphic>
@@ -1880,10 +1880,10 @@
         </p:nvGrpSpPr>
         <p:grpSpPr>
           <a:xfrm>
-            <a:off x="7507486" y="350432"/>
-            <a:ext cx="4667415" cy="588907"/>
-            <a:chOff x="7159083" y="-867193"/>
-            <a:chExt cx="4667415" cy="461667"/>
+            <a:off x="19050" y="6288871"/>
+            <a:ext cx="4667415" cy="544216"/>
+            <a:chOff x="7159083" y="-878255"/>
+            <a:chExt cx="4667415" cy="472727"/>
           </a:xfrm>
         </p:grpSpPr>
         <p:grpSp>
@@ -1900,10 +1900,10 @@
           </p:nvGrpSpPr>
           <p:grpSpPr>
             <a:xfrm>
-              <a:off x="7159083" y="-867193"/>
-              <a:ext cx="4667415" cy="461667"/>
-              <a:chOff x="7745281" y="-629023"/>
-              <a:chExt cx="4560722" cy="461667"/>
+              <a:off x="7159083" y="-878255"/>
+              <a:ext cx="4667415" cy="472727"/>
+              <a:chOff x="7745281" y="-640085"/>
+              <a:chExt cx="4560722" cy="472727"/>
             </a:xfrm>
           </p:grpSpPr>
           <p:sp>
@@ -2021,7 +2021,7 @@
             </p:nvSpPr>
             <p:spPr>
               <a:xfrm>
-                <a:off x="8888610" y="-629021"/>
+                <a:off x="8878920" y="-640085"/>
                 <a:ext cx="1141874" cy="461665"/>
               </a:xfrm>
               <a:prstGeom prst="rect">
@@ -2399,8 +2399,8 @@
         </p:nvSpPr>
         <p:spPr>
           <a:xfrm>
-            <a:off x="19050" y="1006979"/>
-            <a:ext cx="12172950" cy="5848655"/>
+            <a:off x="19050" y="1006980"/>
+            <a:ext cx="12172950" cy="5288516"/>
           </a:xfrm>
         </p:spPr>
         <p:txBody>
@@ -2426,13 +2426,13 @@
           <p:nvPr userDrawn="1">
             <p:extLst>
               <p:ext uri="{D42A27DB-BD31-4B8C-83A1-F6EECF244321}">
-                <p14:modId xmlns:p14="http://schemas.microsoft.com/office/powerpoint/2010/main" val="169841313"/>
+                <p14:modId xmlns:p14="http://schemas.microsoft.com/office/powerpoint/2010/main" val="2031667198"/>
               </p:ext>
             </p:extLst>
           </p:nvPr>
         </p:nvGraphicFramePr>
         <p:xfrm>
-          <a:off x="5225455" y="340216"/>
+          <a:off x="4710260" y="6536628"/>
           <a:ext cx="1130558" cy="296459"/>
         </p:xfrm>
         <a:graphic>
@@ -2634,13 +2634,13 @@
           <p:nvPr userDrawn="1">
             <p:extLst>
               <p:ext uri="{D42A27DB-BD31-4B8C-83A1-F6EECF244321}">
-                <p14:modId xmlns:p14="http://schemas.microsoft.com/office/powerpoint/2010/main" val="3648508608"/>
+                <p14:modId xmlns:p14="http://schemas.microsoft.com/office/powerpoint/2010/main" val="4115375927"/>
               </p:ext>
             </p:extLst>
           </p:nvPr>
         </p:nvGraphicFramePr>
         <p:xfrm>
-          <a:off x="6369153" y="344322"/>
+          <a:off x="7039793" y="6537960"/>
           <a:ext cx="1138333" cy="296458"/>
         </p:xfrm>
         <a:graphic>
@@ -2858,7 +2858,7 @@
         </p:blipFill>
         <p:spPr>
           <a:xfrm>
-            <a:off x="6349332" y="636391"/>
+            <a:off x="5837155" y="6531993"/>
             <a:ext cx="279521" cy="296838"/>
           </a:xfrm>
           <a:prstGeom prst="rect">
@@ -2897,7 +2897,7 @@
         </p:blipFill>
         <p:spPr>
           <a:xfrm>
-            <a:off x="6384914" y="389904"/>
+            <a:off x="7045643" y="6571845"/>
             <a:ext cx="208359" cy="208359"/>
           </a:xfrm>
           <a:prstGeom prst="rect">
@@ -2936,7 +2936,7 @@
         </p:blipFill>
         <p:spPr>
           <a:xfrm>
-            <a:off x="5218252" y="341956"/>
+            <a:off x="4703057" y="6538368"/>
             <a:ext cx="304917" cy="304917"/>
           </a:xfrm>
           <a:prstGeom prst="rect">
@@ -3082,7 +3082,7 @@
         <p:spPr>
           <a:xfrm>
             <a:off x="0" y="350432"/>
-            <a:ext cx="5201080" cy="646331"/>
+            <a:ext cx="12192000" cy="646331"/>
           </a:xfrm>
           <a:prstGeom prst="rect">
             <a:avLst/>
@@ -3101,8 +3101,11 @@
           <a:p>
             <a:r>
               <a:rPr lang="en-US" dirty="0"/>
-              <a:t>Short blurb/story behind the ask and what are the end goals for this theme</a:t>
+              <a:t>Short blurb/story behind the ask and what are the end goals for this theme…</a:t>
             </a:r>
+          </a:p>
+          <a:p>
+            <a:endParaRPr lang="en-US" dirty="0"/>
           </a:p>
         </p:txBody>
       </p:sp>
@@ -3145,7 +3148,7 @@
 
 <file path=ppt/slideLayouts/slideLayout6.xml><?xml version="1.0" encoding="utf-8"?>
 <p:sldLayout xmlns:a="http://schemas.openxmlformats.org/drawingml/2006/main" xmlns:r="http://schemas.openxmlformats.org/officeDocument/2006/relationships" xmlns:p="http://schemas.openxmlformats.org/presentationml/2006/main" preserve="1" userDrawn="1">
-  <p:cSld name="3_Title and Content">
+  <p:cSld name="2_Title and Content">
     <p:spTree>
       <p:nvGrpSpPr>
         <p:cNvPr id="1" name=""/>
@@ -3175,13 +3178,13 @@
           <p:nvPr userDrawn="1">
             <p:extLst>
               <p:ext uri="{D42A27DB-BD31-4B8C-83A1-F6EECF244321}">
-                <p14:modId xmlns:p14="http://schemas.microsoft.com/office/powerpoint/2010/main" val="3990518215"/>
+                <p14:modId xmlns:p14="http://schemas.microsoft.com/office/powerpoint/2010/main" val="3249512282"/>
               </p:ext>
             </p:extLst>
           </p:nvPr>
         </p:nvGraphicFramePr>
         <p:xfrm>
-          <a:off x="6363216" y="636771"/>
+          <a:off x="5860950" y="6538483"/>
           <a:ext cx="1150721" cy="296458"/>
         </p:xfrm>
         <a:graphic>
@@ -3382,10 +3385,10 @@
         </p:nvGrpSpPr>
         <p:grpSpPr>
           <a:xfrm>
-            <a:off x="7507486" y="350432"/>
-            <a:ext cx="4667415" cy="588907"/>
-            <a:chOff x="7159083" y="-867193"/>
-            <a:chExt cx="4667415" cy="461667"/>
+            <a:off x="19050" y="6288871"/>
+            <a:ext cx="4667415" cy="544216"/>
+            <a:chOff x="7159083" y="-878255"/>
+            <a:chExt cx="4667415" cy="472727"/>
           </a:xfrm>
         </p:grpSpPr>
         <p:grpSp>
@@ -3402,10 +3405,10 @@
           </p:nvGrpSpPr>
           <p:grpSpPr>
             <a:xfrm>
-              <a:off x="7159083" y="-867193"/>
-              <a:ext cx="4667415" cy="461667"/>
-              <a:chOff x="7745281" y="-629023"/>
-              <a:chExt cx="4560722" cy="461667"/>
+              <a:off x="7159083" y="-878255"/>
+              <a:ext cx="4667415" cy="472727"/>
+              <a:chOff x="7745281" y="-640085"/>
+              <a:chExt cx="4560722" cy="472727"/>
             </a:xfrm>
           </p:grpSpPr>
           <p:sp>
@@ -3523,7 +3526,7 @@
             </p:nvSpPr>
             <p:spPr>
               <a:xfrm>
-                <a:off x="8888610" y="-629021"/>
+                <a:off x="8878920" y="-640085"/>
                 <a:ext cx="1141874" cy="461665"/>
               </a:xfrm>
               <a:prstGeom prst="rect">
@@ -3898,13 +3901,13 @@
           <p:nvPr userDrawn="1">
             <p:extLst>
               <p:ext uri="{D42A27DB-BD31-4B8C-83A1-F6EECF244321}">
-                <p14:modId xmlns:p14="http://schemas.microsoft.com/office/powerpoint/2010/main" val="169841313"/>
+                <p14:modId xmlns:p14="http://schemas.microsoft.com/office/powerpoint/2010/main" val="2031667198"/>
               </p:ext>
             </p:extLst>
           </p:nvPr>
         </p:nvGraphicFramePr>
         <p:xfrm>
-          <a:off x="5225455" y="340216"/>
+          <a:off x="4710260" y="6536628"/>
           <a:ext cx="1130558" cy="296459"/>
         </p:xfrm>
         <a:graphic>
@@ -4106,13 +4109,13 @@
           <p:nvPr userDrawn="1">
             <p:extLst>
               <p:ext uri="{D42A27DB-BD31-4B8C-83A1-F6EECF244321}">
-                <p14:modId xmlns:p14="http://schemas.microsoft.com/office/powerpoint/2010/main" val="3648508608"/>
+                <p14:modId xmlns:p14="http://schemas.microsoft.com/office/powerpoint/2010/main" val="4115375927"/>
               </p:ext>
             </p:extLst>
           </p:nvPr>
         </p:nvGraphicFramePr>
         <p:xfrm>
-          <a:off x="6369153" y="344322"/>
+          <a:off x="7039793" y="6537960"/>
           <a:ext cx="1138333" cy="296458"/>
         </p:xfrm>
         <a:graphic>
@@ -4330,7 +4333,7 @@
         </p:blipFill>
         <p:spPr>
           <a:xfrm>
-            <a:off x="6349332" y="636391"/>
+            <a:off x="5837155" y="6531993"/>
             <a:ext cx="279521" cy="296838"/>
           </a:xfrm>
           <a:prstGeom prst="rect">
@@ -4369,7 +4372,7 @@
         </p:blipFill>
         <p:spPr>
           <a:xfrm>
-            <a:off x="6384914" y="389904"/>
+            <a:off x="7045643" y="6571845"/>
             <a:ext cx="208359" cy="208359"/>
           </a:xfrm>
           <a:prstGeom prst="rect">
@@ -4408,7 +4411,7 @@
         </p:blipFill>
         <p:spPr>
           <a:xfrm>
-            <a:off x="5218252" y="341956"/>
+            <a:off x="4703057" y="6538368"/>
             <a:ext cx="304917" cy="304917"/>
           </a:xfrm>
           <a:prstGeom prst="rect">
@@ -4554,7 +4557,7 @@
         <p:spPr>
           <a:xfrm>
             <a:off x="0" y="350432"/>
-            <a:ext cx="5201080" cy="646331"/>
+            <a:ext cx="12192000" cy="646331"/>
           </a:xfrm>
           <a:prstGeom prst="rect">
             <a:avLst/>
@@ -4573,15 +4576,18 @@
           <a:p>
             <a:r>
               <a:rPr lang="en-US" dirty="0"/>
-              <a:t>Short blurb/story behind the ask and what are the end goals for this theme</a:t>
+              <a:t>Short blurb/story behind the ask and what are the end goals for this theme…</a:t>
             </a:r>
+          </a:p>
+          <a:p>
+            <a:endParaRPr lang="en-US" dirty="0"/>
           </a:p>
         </p:txBody>
       </p:sp>
     </p:spTree>
     <p:extLst>
       <p:ext uri="{BB962C8B-B14F-4D97-AF65-F5344CB8AC3E}">
-        <p14:creationId xmlns:p14="http://schemas.microsoft.com/office/powerpoint/2010/main" val="429339274"/>
+        <p14:creationId xmlns:p14="http://schemas.microsoft.com/office/powerpoint/2010/main" val="4045705264"/>
       </p:ext>
     </p:extLst>
   </p:cSld>
@@ -6991,7 +6997,7 @@
     <p:sldLayoutId id="2147483667" r:id="rId3"/>
     <p:sldLayoutId id="2147483668" r:id="rId4"/>
     <p:sldLayoutId id="2147483669" r:id="rId5"/>
-    <p:sldLayoutId id="2147483675" r:id="rId6"/>
+    <p:sldLayoutId id="2147483676" r:id="rId6"/>
     <p:sldLayoutId id="2147483670" r:id="rId7"/>
     <p:sldLayoutId id="2147483671" r:id="rId8"/>
     <p:sldLayoutId id="2147483672" r:id="rId9"/>

</xml_diff>